<commit_message>
remodularizacion, ya esta terminada gran parte de la app
</commit_message>
<xml_diff>
--- a/documentos/FINANZAS.pptx
+++ b/documentos/FINANZAS.pptx
@@ -293,7 +293,7 @@
           <a:p>
             <a:fld id="{360A753D-C93B-4D15-A597-306F64BE7CB8}" type="datetimeFigureOut">
               <a:rPr lang="es-CO" smtClean="0"/>
-              <a:t>10/04/2022</a:t>
+              <a:t>11/04/2022</a:t>
             </a:fld>
             <a:endParaRPr lang="es-CO"/>
           </a:p>
@@ -493,7 +493,7 @@
           <a:p>
             <a:fld id="{360A753D-C93B-4D15-A597-306F64BE7CB8}" type="datetimeFigureOut">
               <a:rPr lang="es-CO" smtClean="0"/>
-              <a:t>10/04/2022</a:t>
+              <a:t>11/04/2022</a:t>
             </a:fld>
             <a:endParaRPr lang="es-CO"/>
           </a:p>
@@ -703,7 +703,7 @@
           <a:p>
             <a:fld id="{360A753D-C93B-4D15-A597-306F64BE7CB8}" type="datetimeFigureOut">
               <a:rPr lang="es-CO" smtClean="0"/>
-              <a:t>10/04/2022</a:t>
+              <a:t>11/04/2022</a:t>
             </a:fld>
             <a:endParaRPr lang="es-CO"/>
           </a:p>
@@ -903,7 +903,7 @@
           <a:p>
             <a:fld id="{360A753D-C93B-4D15-A597-306F64BE7CB8}" type="datetimeFigureOut">
               <a:rPr lang="es-CO" smtClean="0"/>
-              <a:t>10/04/2022</a:t>
+              <a:t>11/04/2022</a:t>
             </a:fld>
             <a:endParaRPr lang="es-CO"/>
           </a:p>
@@ -1179,7 +1179,7 @@
           <a:p>
             <a:fld id="{360A753D-C93B-4D15-A597-306F64BE7CB8}" type="datetimeFigureOut">
               <a:rPr lang="es-CO" smtClean="0"/>
-              <a:t>10/04/2022</a:t>
+              <a:t>11/04/2022</a:t>
             </a:fld>
             <a:endParaRPr lang="es-CO"/>
           </a:p>
@@ -1447,7 +1447,7 @@
           <a:p>
             <a:fld id="{360A753D-C93B-4D15-A597-306F64BE7CB8}" type="datetimeFigureOut">
               <a:rPr lang="es-CO" smtClean="0"/>
-              <a:t>10/04/2022</a:t>
+              <a:t>11/04/2022</a:t>
             </a:fld>
             <a:endParaRPr lang="es-CO"/>
           </a:p>
@@ -1862,7 +1862,7 @@
           <a:p>
             <a:fld id="{360A753D-C93B-4D15-A597-306F64BE7CB8}" type="datetimeFigureOut">
               <a:rPr lang="es-CO" smtClean="0"/>
-              <a:t>10/04/2022</a:t>
+              <a:t>11/04/2022</a:t>
             </a:fld>
             <a:endParaRPr lang="es-CO"/>
           </a:p>
@@ -2004,7 +2004,7 @@
           <a:p>
             <a:fld id="{360A753D-C93B-4D15-A597-306F64BE7CB8}" type="datetimeFigureOut">
               <a:rPr lang="es-CO" smtClean="0"/>
-              <a:t>10/04/2022</a:t>
+              <a:t>11/04/2022</a:t>
             </a:fld>
             <a:endParaRPr lang="es-CO"/>
           </a:p>
@@ -2117,7 +2117,7 @@
           <a:p>
             <a:fld id="{360A753D-C93B-4D15-A597-306F64BE7CB8}" type="datetimeFigureOut">
               <a:rPr lang="es-CO" smtClean="0"/>
-              <a:t>10/04/2022</a:t>
+              <a:t>11/04/2022</a:t>
             </a:fld>
             <a:endParaRPr lang="es-CO"/>
           </a:p>
@@ -2430,7 +2430,7 @@
           <a:p>
             <a:fld id="{360A753D-C93B-4D15-A597-306F64BE7CB8}" type="datetimeFigureOut">
               <a:rPr lang="es-CO" smtClean="0"/>
-              <a:t>10/04/2022</a:t>
+              <a:t>11/04/2022</a:t>
             </a:fld>
             <a:endParaRPr lang="es-CO"/>
           </a:p>
@@ -2719,7 +2719,7 @@
           <a:p>
             <a:fld id="{360A753D-C93B-4D15-A597-306F64BE7CB8}" type="datetimeFigureOut">
               <a:rPr lang="es-CO" smtClean="0"/>
-              <a:t>10/04/2022</a:t>
+              <a:t>11/04/2022</a:t>
             </a:fld>
             <a:endParaRPr lang="es-CO"/>
           </a:p>
@@ -2962,7 +2962,7 @@
           <a:p>
             <a:fld id="{360A753D-C93B-4D15-A597-306F64BE7CB8}" type="datetimeFigureOut">
               <a:rPr lang="es-CO" smtClean="0"/>
-              <a:t>10/04/2022</a:t>
+              <a:t>11/04/2022</a:t>
             </a:fld>
             <a:endParaRPr lang="es-CO"/>
           </a:p>

</xml_diff>